<commit_message>
added the remaining gestalt laws
</commit_message>
<xml_diff>
--- a/degree-thesis/en/Examples/gestalt.pptx
+++ b/degree-thesis/en/Examples/gestalt.pptx
@@ -9,6 +9,7 @@
     <p:sldId id="262" r:id="rId3"/>
     <p:sldId id="264" r:id="rId4"/>
     <p:sldId id="265" r:id="rId5"/>
+    <p:sldId id="266" r:id="rId6"/>
   </p:sldIdLst>
   <p:sldSz cx="8280400" cy="4319588"/>
   <p:notesSz cx="6858000" cy="9144000"/>
@@ -9859,58 +9860,2101 @@
       </p:grpSpPr>
       <p:sp>
         <p:nvSpPr>
-          <p:cNvPr id="2" name="Title 1">
+          <p:cNvPr id="23" name="Oval 22">
             <a:extLst>
               <a:ext uri="{FF2B5EF4-FFF2-40B4-BE49-F238E27FC236}">
-                <a16:creationId xmlns:a16="http://schemas.microsoft.com/office/drawing/2014/main" id="{D44FE7BC-1F8F-9D4F-9E5E-1C4AD6AF45AA}"/>
+                <a16:creationId xmlns:a16="http://schemas.microsoft.com/office/drawing/2014/main" id="{7782C45F-0832-884E-B248-F7642435C025}"/>
               </a:ext>
             </a:extLst>
           </p:cNvPr>
-          <p:cNvSpPr>
-            <a:spLocks noGrp="1"/>
-          </p:cNvSpPr>
-          <p:nvPr>
-            <p:ph type="title"/>
-          </p:nvPr>
-        </p:nvSpPr>
-        <p:spPr/>
-        <p:txBody>
-          <a:bodyPr/>
+          <p:cNvSpPr/>
+          <p:nvPr/>
+        </p:nvSpPr>
+        <p:spPr>
+          <a:xfrm>
+            <a:off x="105645" y="131220"/>
+            <a:ext cx="447289" cy="447289"/>
+          </a:xfrm>
+          <a:prstGeom prst="ellipse">
+            <a:avLst/>
+          </a:prstGeom>
+          <a:noFill/>
+          <a:ln>
+            <a:solidFill>
+              <a:schemeClr val="tx1"/>
+            </a:solidFill>
+          </a:ln>
+        </p:spPr>
+        <p:style>
+          <a:lnRef idx="2">
+            <a:schemeClr val="accent1">
+              <a:shade val="50000"/>
+            </a:schemeClr>
+          </a:lnRef>
+          <a:fillRef idx="1">
+            <a:schemeClr val="accent1"/>
+          </a:fillRef>
+          <a:effectRef idx="0">
+            <a:schemeClr val="accent1"/>
+          </a:effectRef>
+          <a:fontRef idx="minor">
+            <a:schemeClr val="lt1"/>
+          </a:fontRef>
+        </p:style>
+        <p:txBody>
+          <a:bodyPr rot="0" spcFirstLastPara="0" vertOverflow="overflow" horzOverflow="overflow" vert="horz" wrap="square" lIns="91440" tIns="45720" rIns="91440" bIns="45720" numCol="1" spcCol="0" rtlCol="0" fromWordArt="0" anchor="ctr" anchorCtr="0" forceAA="0" compatLnSpc="1">
+            <a:prstTxWarp prst="textNoShape">
+              <a:avLst/>
+            </a:prstTxWarp>
+            <a:noAutofit/>
+          </a:bodyPr>
           <a:lstStyle/>
           <a:p>
-            <a:endParaRPr lang="de-DE"/>
-          </a:p>
-        </p:txBody>
-      </p:sp>
-      <p:sp>
-        <p:nvSpPr>
-          <p:cNvPr id="3" name="Content Placeholder 2">
+            <a:pPr algn="ctr"/>
+            <a:endParaRPr lang="de-DE">
+              <a:latin typeface="Roboto" panose="02000000000000000000" pitchFamily="2" charset="0"/>
+              <a:ea typeface="Roboto" panose="02000000000000000000" pitchFamily="2" charset="0"/>
+            </a:endParaRPr>
+          </a:p>
+        </p:txBody>
+      </p:sp>
+      <p:sp>
+        <p:nvSpPr>
+          <p:cNvPr id="22" name="Rectangle 21">
             <a:extLst>
               <a:ext uri="{FF2B5EF4-FFF2-40B4-BE49-F238E27FC236}">
-                <a16:creationId xmlns:a16="http://schemas.microsoft.com/office/drawing/2014/main" id="{C8D91BA3-EB59-2845-97E6-83DD3AFA9932}"/>
+                <a16:creationId xmlns:a16="http://schemas.microsoft.com/office/drawing/2014/main" id="{21D47085-8696-1846-9709-A6A80CB9C0EA}"/>
               </a:ext>
             </a:extLst>
           </p:cNvPr>
-          <p:cNvSpPr>
-            <a:spLocks noGrp="1"/>
-          </p:cNvSpPr>
-          <p:nvPr>
-            <p:ph idx="1"/>
-          </p:nvPr>
-        </p:nvSpPr>
-        <p:spPr/>
-        <p:txBody>
-          <a:bodyPr/>
+          <p:cNvSpPr/>
+          <p:nvPr/>
+        </p:nvSpPr>
+        <p:spPr>
+          <a:xfrm>
+            <a:off x="323849" y="358633"/>
+            <a:ext cx="672752" cy="349534"/>
+          </a:xfrm>
+          <a:prstGeom prst="rect">
+            <a:avLst/>
+          </a:prstGeom>
+          <a:solidFill>
+            <a:schemeClr val="tx2">
+              <a:lumMod val="60000"/>
+              <a:lumOff val="40000"/>
+            </a:schemeClr>
+          </a:solidFill>
+          <a:ln>
+            <a:noFill/>
+          </a:ln>
+        </p:spPr>
+        <p:style>
+          <a:lnRef idx="2">
+            <a:schemeClr val="accent1">
+              <a:shade val="50000"/>
+            </a:schemeClr>
+          </a:lnRef>
+          <a:fillRef idx="1">
+            <a:schemeClr val="accent1"/>
+          </a:fillRef>
+          <a:effectRef idx="0">
+            <a:schemeClr val="accent1"/>
+          </a:effectRef>
+          <a:fontRef idx="minor">
+            <a:schemeClr val="lt1"/>
+          </a:fontRef>
+        </p:style>
+        <p:txBody>
+          <a:bodyPr rot="0" spcFirstLastPara="0" vertOverflow="overflow" horzOverflow="overflow" vert="horz" wrap="square" lIns="91440" tIns="45720" rIns="91440" bIns="45720" numCol="1" spcCol="0" rtlCol="0" fromWordArt="0" anchor="ctr" anchorCtr="0" forceAA="0" compatLnSpc="1">
+            <a:prstTxWarp prst="textNoShape">
+              <a:avLst/>
+            </a:prstTxWarp>
+            <a:noAutofit/>
+          </a:bodyPr>
           <a:lstStyle/>
           <a:p>
-            <a:endParaRPr lang="de-DE"/>
+            <a:pPr algn="ctr"/>
+            <a:endParaRPr lang="de-DE">
+              <a:latin typeface="Roboto" panose="02000000000000000000" pitchFamily="2" charset="0"/>
+              <a:ea typeface="Roboto" panose="02000000000000000000" pitchFamily="2" charset="0"/>
+            </a:endParaRPr>
+          </a:p>
+        </p:txBody>
+      </p:sp>
+      <p:sp>
+        <p:nvSpPr>
+          <p:cNvPr id="29" name="Freeform 28">
+            <a:extLst>
+              <a:ext uri="{FF2B5EF4-FFF2-40B4-BE49-F238E27FC236}">
+                <a16:creationId xmlns:a16="http://schemas.microsoft.com/office/drawing/2014/main" id="{9E0BF3CF-07A3-1B4A-A131-0693750F1C19}"/>
+              </a:ext>
+            </a:extLst>
+          </p:cNvPr>
+          <p:cNvSpPr/>
+          <p:nvPr/>
+        </p:nvSpPr>
+        <p:spPr>
+          <a:xfrm>
+            <a:off x="106383" y="855526"/>
+            <a:ext cx="446551" cy="446952"/>
+          </a:xfrm>
+          <a:custGeom>
+            <a:avLst/>
+            <a:gdLst>
+              <a:gd name="connsiteX0" fmla="*/ 182833 w 365063"/>
+              <a:gd name="connsiteY0" fmla="*/ 0 h 365391"/>
+              <a:gd name="connsiteX1" fmla="*/ 361951 w 365063"/>
+              <a:gd name="connsiteY1" fmla="*/ 145986 h 365391"/>
+              <a:gd name="connsiteX2" fmla="*/ 365063 w 365063"/>
+              <a:gd name="connsiteY2" fmla="*/ 176856 h 365391"/>
+              <a:gd name="connsiteX3" fmla="*/ 180103 w 365063"/>
+              <a:gd name="connsiteY3" fmla="*/ 176856 h 365391"/>
+              <a:gd name="connsiteX4" fmla="*/ 180103 w 365063"/>
+              <a:gd name="connsiteY4" fmla="*/ 365391 h 365391"/>
+              <a:gd name="connsiteX5" fmla="*/ 145986 w 365063"/>
+              <a:gd name="connsiteY5" fmla="*/ 361951 h 365391"/>
+              <a:gd name="connsiteX6" fmla="*/ 0 w 365063"/>
+              <a:gd name="connsiteY6" fmla="*/ 182833 h 365391"/>
+              <a:gd name="connsiteX7" fmla="*/ 182833 w 365063"/>
+              <a:gd name="connsiteY7" fmla="*/ 0 h 365391"/>
+            </a:gdLst>
+            <a:ahLst/>
+            <a:cxnLst>
+              <a:cxn ang="0">
+                <a:pos x="connsiteX0" y="connsiteY0"/>
+              </a:cxn>
+              <a:cxn ang="0">
+                <a:pos x="connsiteX1" y="connsiteY1"/>
+              </a:cxn>
+              <a:cxn ang="0">
+                <a:pos x="connsiteX2" y="connsiteY2"/>
+              </a:cxn>
+              <a:cxn ang="0">
+                <a:pos x="connsiteX3" y="connsiteY3"/>
+              </a:cxn>
+              <a:cxn ang="0">
+                <a:pos x="connsiteX4" y="connsiteY4"/>
+              </a:cxn>
+              <a:cxn ang="0">
+                <a:pos x="connsiteX5" y="connsiteY5"/>
+              </a:cxn>
+              <a:cxn ang="0">
+                <a:pos x="connsiteX6" y="connsiteY6"/>
+              </a:cxn>
+              <a:cxn ang="0">
+                <a:pos x="connsiteX7" y="connsiteY7"/>
+              </a:cxn>
+            </a:cxnLst>
+            <a:rect l="l" t="t" r="r" b="b"/>
+            <a:pathLst>
+              <a:path w="365063" h="365391">
+                <a:moveTo>
+                  <a:pt x="182833" y="0"/>
+                </a:moveTo>
+                <a:cubicBezTo>
+                  <a:pt x="271187" y="0"/>
+                  <a:pt x="344903" y="62672"/>
+                  <a:pt x="361951" y="145986"/>
+                </a:cubicBezTo>
+                <a:lnTo>
+                  <a:pt x="365063" y="176856"/>
+                </a:lnTo>
+                <a:lnTo>
+                  <a:pt x="180103" y="176856"/>
+                </a:lnTo>
+                <a:lnTo>
+                  <a:pt x="180103" y="365391"/>
+                </a:lnTo>
+                <a:lnTo>
+                  <a:pt x="145986" y="361951"/>
+                </a:lnTo>
+                <a:cubicBezTo>
+                  <a:pt x="62672" y="344903"/>
+                  <a:pt x="0" y="271187"/>
+                  <a:pt x="0" y="182833"/>
+                </a:cubicBezTo>
+                <a:cubicBezTo>
+                  <a:pt x="0" y="81857"/>
+                  <a:pt x="81857" y="0"/>
+                  <a:pt x="182833" y="0"/>
+                </a:cubicBezTo>
+                <a:close/>
+              </a:path>
+            </a:pathLst>
+          </a:custGeom>
+          <a:noFill/>
+          <a:ln>
+            <a:solidFill>
+              <a:schemeClr val="tx1"/>
+            </a:solidFill>
+          </a:ln>
+        </p:spPr>
+        <p:style>
+          <a:lnRef idx="2">
+            <a:schemeClr val="accent1">
+              <a:shade val="50000"/>
+            </a:schemeClr>
+          </a:lnRef>
+          <a:fillRef idx="1">
+            <a:schemeClr val="accent1"/>
+          </a:fillRef>
+          <a:effectRef idx="0">
+            <a:schemeClr val="accent1"/>
+          </a:effectRef>
+          <a:fontRef idx="minor">
+            <a:schemeClr val="lt1"/>
+          </a:fontRef>
+        </p:style>
+        <p:txBody>
+          <a:bodyPr rot="0" spcFirstLastPara="0" vertOverflow="overflow" horzOverflow="overflow" vert="horz" wrap="square" lIns="91440" tIns="45720" rIns="91440" bIns="45720" numCol="1" spcCol="0" rtlCol="0" fromWordArt="0" anchor="ctr" anchorCtr="0" forceAA="0" compatLnSpc="1">
+            <a:prstTxWarp prst="textNoShape">
+              <a:avLst/>
+            </a:prstTxWarp>
+            <a:noAutofit/>
+          </a:bodyPr>
+          <a:lstStyle/>
+          <a:p>
+            <a:pPr algn="ctr"/>
+            <a:endParaRPr lang="de-DE">
+              <a:latin typeface="Roboto" panose="02000000000000000000" pitchFamily="2" charset="0"/>
+              <a:ea typeface="Roboto" panose="02000000000000000000" pitchFamily="2" charset="0"/>
+            </a:endParaRPr>
+          </a:p>
+        </p:txBody>
+      </p:sp>
+      <p:sp>
+        <p:nvSpPr>
+          <p:cNvPr id="31" name="Freeform 30">
+            <a:extLst>
+              <a:ext uri="{FF2B5EF4-FFF2-40B4-BE49-F238E27FC236}">
+                <a16:creationId xmlns:a16="http://schemas.microsoft.com/office/drawing/2014/main" id="{530854FA-94FF-DD48-A1EB-92B6FE09A3DD}"/>
+              </a:ext>
+            </a:extLst>
+          </p:cNvPr>
+          <p:cNvSpPr/>
+          <p:nvPr/>
+        </p:nvSpPr>
+        <p:spPr>
+          <a:xfrm>
+            <a:off x="410691" y="1160002"/>
+            <a:ext cx="672752" cy="349534"/>
+          </a:xfrm>
+          <a:custGeom>
+            <a:avLst/>
+            <a:gdLst>
+              <a:gd name="connsiteX0" fmla="*/ 1 w 549986"/>
+              <a:gd name="connsiteY0" fmla="*/ 0 h 285750"/>
+              <a:gd name="connsiteX1" fmla="*/ 184960 w 549986"/>
+              <a:gd name="connsiteY1" fmla="*/ 0 h 285750"/>
+              <a:gd name="connsiteX2" fmla="*/ 184961 w 549986"/>
+              <a:gd name="connsiteY2" fmla="*/ 0 h 285750"/>
+              <a:gd name="connsiteX3" fmla="*/ 549986 w 549986"/>
+              <a:gd name="connsiteY3" fmla="*/ 0 h 285750"/>
+              <a:gd name="connsiteX4" fmla="*/ 549986 w 549986"/>
+              <a:gd name="connsiteY4" fmla="*/ 285750 h 285750"/>
+              <a:gd name="connsiteX5" fmla="*/ 0 w 549986"/>
+              <a:gd name="connsiteY5" fmla="*/ 285750 h 285750"/>
+              <a:gd name="connsiteX6" fmla="*/ 0 w 549986"/>
+              <a:gd name="connsiteY6" fmla="*/ 188535 h 285750"/>
+              <a:gd name="connsiteX7" fmla="*/ 2730 w 549986"/>
+              <a:gd name="connsiteY7" fmla="*/ 188810 h 285750"/>
+              <a:gd name="connsiteX8" fmla="*/ 2731 w 549986"/>
+              <a:gd name="connsiteY8" fmla="*/ 188810 h 285750"/>
+              <a:gd name="connsiteX9" fmla="*/ 1 w 549986"/>
+              <a:gd name="connsiteY9" fmla="*/ 188535 h 285750"/>
+            </a:gdLst>
+            <a:ahLst/>
+            <a:cxnLst>
+              <a:cxn ang="0">
+                <a:pos x="connsiteX0" y="connsiteY0"/>
+              </a:cxn>
+              <a:cxn ang="0">
+                <a:pos x="connsiteX1" y="connsiteY1"/>
+              </a:cxn>
+              <a:cxn ang="0">
+                <a:pos x="connsiteX2" y="connsiteY2"/>
+              </a:cxn>
+              <a:cxn ang="0">
+                <a:pos x="connsiteX3" y="connsiteY3"/>
+              </a:cxn>
+              <a:cxn ang="0">
+                <a:pos x="connsiteX4" y="connsiteY4"/>
+              </a:cxn>
+              <a:cxn ang="0">
+                <a:pos x="connsiteX5" y="connsiteY5"/>
+              </a:cxn>
+              <a:cxn ang="0">
+                <a:pos x="connsiteX6" y="connsiteY6"/>
+              </a:cxn>
+              <a:cxn ang="0">
+                <a:pos x="connsiteX7" y="connsiteY7"/>
+              </a:cxn>
+              <a:cxn ang="0">
+                <a:pos x="connsiteX8" y="connsiteY8"/>
+              </a:cxn>
+              <a:cxn ang="0">
+                <a:pos x="connsiteX9" y="connsiteY9"/>
+              </a:cxn>
+            </a:cxnLst>
+            <a:rect l="l" t="t" r="r" b="b"/>
+            <a:pathLst>
+              <a:path w="549986" h="285750">
+                <a:moveTo>
+                  <a:pt x="1" y="0"/>
+                </a:moveTo>
+                <a:lnTo>
+                  <a:pt x="184960" y="0"/>
+                </a:lnTo>
+                <a:lnTo>
+                  <a:pt x="184961" y="0"/>
+                </a:lnTo>
+                <a:lnTo>
+                  <a:pt x="549986" y="0"/>
+                </a:lnTo>
+                <a:lnTo>
+                  <a:pt x="549986" y="285750"/>
+                </a:lnTo>
+                <a:lnTo>
+                  <a:pt x="0" y="285750"/>
+                </a:lnTo>
+                <a:lnTo>
+                  <a:pt x="0" y="188535"/>
+                </a:lnTo>
+                <a:lnTo>
+                  <a:pt x="2730" y="188810"/>
+                </a:lnTo>
+                <a:lnTo>
+                  <a:pt x="2731" y="188810"/>
+                </a:lnTo>
+                <a:lnTo>
+                  <a:pt x="1" y="188535"/>
+                </a:lnTo>
+                <a:close/>
+              </a:path>
+            </a:pathLst>
+          </a:custGeom>
+          <a:solidFill>
+            <a:schemeClr val="tx2">
+              <a:lumMod val="60000"/>
+              <a:lumOff val="40000"/>
+            </a:schemeClr>
+          </a:solidFill>
+          <a:ln>
+            <a:noFill/>
+          </a:ln>
+        </p:spPr>
+        <p:style>
+          <a:lnRef idx="2">
+            <a:schemeClr val="accent1">
+              <a:shade val="50000"/>
+            </a:schemeClr>
+          </a:lnRef>
+          <a:fillRef idx="1">
+            <a:schemeClr val="accent1"/>
+          </a:fillRef>
+          <a:effectRef idx="0">
+            <a:schemeClr val="accent1"/>
+          </a:effectRef>
+          <a:fontRef idx="minor">
+            <a:schemeClr val="lt1"/>
+          </a:fontRef>
+        </p:style>
+        <p:txBody>
+          <a:bodyPr rot="0" spcFirstLastPara="0" vertOverflow="overflow" horzOverflow="overflow" vert="horz" wrap="square" lIns="91440" tIns="45720" rIns="91440" bIns="45720" numCol="1" spcCol="0" rtlCol="0" fromWordArt="0" anchor="ctr" anchorCtr="0" forceAA="0" compatLnSpc="1">
+            <a:prstTxWarp prst="textNoShape">
+              <a:avLst/>
+            </a:prstTxWarp>
+            <a:noAutofit/>
+          </a:bodyPr>
+          <a:lstStyle/>
+          <a:p>
+            <a:pPr algn="ctr"/>
+            <a:endParaRPr lang="de-DE">
+              <a:latin typeface="Roboto" panose="02000000000000000000" pitchFamily="2" charset="0"/>
+              <a:ea typeface="Roboto" panose="02000000000000000000" pitchFamily="2" charset="0"/>
+            </a:endParaRPr>
+          </a:p>
+        </p:txBody>
+      </p:sp>
+      <p:sp>
+        <p:nvSpPr>
+          <p:cNvPr id="79" name="Oval 78">
+            <a:extLst>
+              <a:ext uri="{FF2B5EF4-FFF2-40B4-BE49-F238E27FC236}">
+                <a16:creationId xmlns:a16="http://schemas.microsoft.com/office/drawing/2014/main" id="{DFD1768D-39E5-0447-A3CD-033A7BDC8484}"/>
+              </a:ext>
+            </a:extLst>
+          </p:cNvPr>
+          <p:cNvSpPr/>
+          <p:nvPr/>
+        </p:nvSpPr>
+        <p:spPr>
+          <a:xfrm rot="5400000">
+            <a:off x="1754690" y="1296814"/>
+            <a:ext cx="212722" cy="212722"/>
+          </a:xfrm>
+          <a:prstGeom prst="ellipse">
+            <a:avLst/>
+          </a:prstGeom>
+          <a:solidFill>
+            <a:schemeClr val="tx2">
+              <a:lumMod val="60000"/>
+              <a:lumOff val="40000"/>
+            </a:schemeClr>
+          </a:solidFill>
+          <a:ln>
+            <a:noFill/>
+          </a:ln>
+        </p:spPr>
+        <p:style>
+          <a:lnRef idx="2">
+            <a:schemeClr val="accent1">
+              <a:shade val="50000"/>
+            </a:schemeClr>
+          </a:lnRef>
+          <a:fillRef idx="1">
+            <a:schemeClr val="accent1"/>
+          </a:fillRef>
+          <a:effectRef idx="0">
+            <a:schemeClr val="accent1"/>
+          </a:effectRef>
+          <a:fontRef idx="minor">
+            <a:schemeClr val="lt1"/>
+          </a:fontRef>
+        </p:style>
+        <p:txBody>
+          <a:bodyPr rot="0" spcFirstLastPara="0" vertOverflow="overflow" horzOverflow="overflow" vert="horz" wrap="square" lIns="91440" tIns="45720" rIns="91440" bIns="45720" numCol="1" spcCol="0" rtlCol="0" fromWordArt="0" anchor="ctr" anchorCtr="0" forceAA="0" compatLnSpc="1">
+            <a:prstTxWarp prst="textNoShape">
+              <a:avLst/>
+            </a:prstTxWarp>
+            <a:noAutofit/>
+          </a:bodyPr>
+          <a:lstStyle/>
+          <a:p>
+            <a:pPr algn="ctr"/>
+            <a:endParaRPr lang="de-DE">
+              <a:latin typeface="Roboto" panose="02000000000000000000" pitchFamily="2" charset="0"/>
+              <a:ea typeface="Roboto" panose="02000000000000000000" pitchFamily="2" charset="0"/>
+            </a:endParaRPr>
+          </a:p>
+        </p:txBody>
+      </p:sp>
+      <p:sp>
+        <p:nvSpPr>
+          <p:cNvPr id="84" name="Oval 83">
+            <a:extLst>
+              <a:ext uri="{FF2B5EF4-FFF2-40B4-BE49-F238E27FC236}">
+                <a16:creationId xmlns:a16="http://schemas.microsoft.com/office/drawing/2014/main" id="{74871A07-B778-194A-9850-D6BD8EB49253}"/>
+              </a:ext>
+            </a:extLst>
+          </p:cNvPr>
+          <p:cNvSpPr/>
+          <p:nvPr/>
+        </p:nvSpPr>
+        <p:spPr>
+          <a:xfrm rot="5400000">
+            <a:off x="2102509" y="131220"/>
+            <a:ext cx="212722" cy="212722"/>
+          </a:xfrm>
+          <a:prstGeom prst="ellipse">
+            <a:avLst/>
+          </a:prstGeom>
+          <a:solidFill>
+            <a:schemeClr val="tx2">
+              <a:lumMod val="60000"/>
+              <a:lumOff val="40000"/>
+            </a:schemeClr>
+          </a:solidFill>
+          <a:ln>
+            <a:noFill/>
+          </a:ln>
+        </p:spPr>
+        <p:style>
+          <a:lnRef idx="2">
+            <a:schemeClr val="accent1">
+              <a:shade val="50000"/>
+            </a:schemeClr>
+          </a:lnRef>
+          <a:fillRef idx="1">
+            <a:schemeClr val="accent1"/>
+          </a:fillRef>
+          <a:effectRef idx="0">
+            <a:schemeClr val="accent1"/>
+          </a:effectRef>
+          <a:fontRef idx="minor">
+            <a:schemeClr val="lt1"/>
+          </a:fontRef>
+        </p:style>
+        <p:txBody>
+          <a:bodyPr rot="0" spcFirstLastPara="0" vertOverflow="overflow" horzOverflow="overflow" vert="horz" wrap="square" lIns="91440" tIns="45720" rIns="91440" bIns="45720" numCol="1" spcCol="0" rtlCol="0" fromWordArt="0" anchor="ctr" anchorCtr="0" forceAA="0" compatLnSpc="1">
+            <a:prstTxWarp prst="textNoShape">
+              <a:avLst/>
+            </a:prstTxWarp>
+            <a:noAutofit/>
+          </a:bodyPr>
+          <a:lstStyle/>
+          <a:p>
+            <a:pPr algn="ctr"/>
+            <a:endParaRPr lang="de-DE">
+              <a:latin typeface="Roboto" panose="02000000000000000000" pitchFamily="2" charset="0"/>
+              <a:ea typeface="Roboto" panose="02000000000000000000" pitchFamily="2" charset="0"/>
+            </a:endParaRPr>
+          </a:p>
+        </p:txBody>
+      </p:sp>
+      <p:cxnSp>
+        <p:nvCxnSpPr>
+          <p:cNvPr id="121" name="Straight Connector 120">
+            <a:extLst>
+              <a:ext uri="{FF2B5EF4-FFF2-40B4-BE49-F238E27FC236}">
+                <a16:creationId xmlns:a16="http://schemas.microsoft.com/office/drawing/2014/main" id="{5F76391A-BFBD-5048-9BED-A40FD97209B5}"/>
+              </a:ext>
+            </a:extLst>
+          </p:cNvPr>
+          <p:cNvCxnSpPr>
+            <a:cxnSpLocks/>
+          </p:cNvCxnSpPr>
+          <p:nvPr/>
+        </p:nvCxnSpPr>
+        <p:spPr>
+          <a:xfrm rot="5400000" flipH="1">
+            <a:off x="1353106" y="494851"/>
+            <a:ext cx="324695" cy="0"/>
+          </a:xfrm>
+          <a:prstGeom prst="line">
+            <a:avLst/>
+          </a:prstGeom>
+          <a:ln w="12700">
+            <a:solidFill>
+              <a:schemeClr val="tx2">
+                <a:lumMod val="60000"/>
+                <a:lumOff val="40000"/>
+              </a:schemeClr>
+            </a:solidFill>
+          </a:ln>
+        </p:spPr>
+        <p:style>
+          <a:lnRef idx="1">
+            <a:schemeClr val="accent1"/>
+          </a:lnRef>
+          <a:fillRef idx="0">
+            <a:schemeClr val="accent1"/>
+          </a:fillRef>
+          <a:effectRef idx="0">
+            <a:schemeClr val="accent1"/>
+          </a:effectRef>
+          <a:fontRef idx="minor">
+            <a:schemeClr val="tx1"/>
+          </a:fontRef>
+        </p:style>
+      </p:cxnSp>
+      <p:sp>
+        <p:nvSpPr>
+          <p:cNvPr id="105" name="Rectangle 104">
+            <a:extLst>
+              <a:ext uri="{FF2B5EF4-FFF2-40B4-BE49-F238E27FC236}">
+                <a16:creationId xmlns:a16="http://schemas.microsoft.com/office/drawing/2014/main" id="{9EAD26BB-9887-E341-9C60-E549F7BFE15E}"/>
+              </a:ext>
+            </a:extLst>
+          </p:cNvPr>
+          <p:cNvSpPr/>
+          <p:nvPr/>
+        </p:nvSpPr>
+        <p:spPr>
+          <a:xfrm rot="5400000">
+            <a:off x="1758958" y="131220"/>
+            <a:ext cx="212722" cy="212722"/>
+          </a:xfrm>
+          <a:prstGeom prst="rect">
+            <a:avLst/>
+          </a:prstGeom>
+          <a:solidFill>
+            <a:schemeClr val="tx2">
+              <a:lumMod val="60000"/>
+              <a:lumOff val="40000"/>
+            </a:schemeClr>
+          </a:solidFill>
+          <a:ln>
+            <a:noFill/>
+          </a:ln>
+        </p:spPr>
+        <p:style>
+          <a:lnRef idx="2">
+            <a:schemeClr val="accent1">
+              <a:shade val="50000"/>
+            </a:schemeClr>
+          </a:lnRef>
+          <a:fillRef idx="1">
+            <a:schemeClr val="accent1"/>
+          </a:fillRef>
+          <a:effectRef idx="0">
+            <a:schemeClr val="accent1"/>
+          </a:effectRef>
+          <a:fontRef idx="minor">
+            <a:schemeClr val="lt1"/>
+          </a:fontRef>
+        </p:style>
+        <p:txBody>
+          <a:bodyPr rot="0" spcFirstLastPara="0" vertOverflow="overflow" horzOverflow="overflow" vert="horz" wrap="square" lIns="91440" tIns="45720" rIns="91440" bIns="45720" numCol="1" spcCol="0" rtlCol="0" fromWordArt="0" anchor="ctr" anchorCtr="0" forceAA="0" compatLnSpc="1">
+            <a:prstTxWarp prst="textNoShape">
+              <a:avLst/>
+            </a:prstTxWarp>
+            <a:noAutofit/>
+          </a:bodyPr>
+          <a:lstStyle/>
+          <a:p>
+            <a:pPr algn="ctr"/>
+            <a:endParaRPr lang="de-DE">
+              <a:latin typeface="Roboto" panose="02000000000000000000" pitchFamily="2" charset="0"/>
+              <a:ea typeface="Roboto" panose="02000000000000000000" pitchFamily="2" charset="0"/>
+            </a:endParaRPr>
+          </a:p>
+        </p:txBody>
+      </p:sp>
+      <p:sp>
+        <p:nvSpPr>
+          <p:cNvPr id="110" name="Rectangle 109">
+            <a:extLst>
+              <a:ext uri="{FF2B5EF4-FFF2-40B4-BE49-F238E27FC236}">
+                <a16:creationId xmlns:a16="http://schemas.microsoft.com/office/drawing/2014/main" id="{05BB2968-486F-5341-BCEF-077E50BEB04E}"/>
+              </a:ext>
+            </a:extLst>
+          </p:cNvPr>
+          <p:cNvSpPr/>
+          <p:nvPr/>
+        </p:nvSpPr>
+        <p:spPr>
+          <a:xfrm rot="5400000">
+            <a:off x="2102509" y="511604"/>
+            <a:ext cx="212722" cy="212722"/>
+          </a:xfrm>
+          <a:prstGeom prst="rect">
+            <a:avLst/>
+          </a:prstGeom>
+          <a:solidFill>
+            <a:schemeClr val="tx2">
+              <a:lumMod val="60000"/>
+              <a:lumOff val="40000"/>
+            </a:schemeClr>
+          </a:solidFill>
+          <a:ln>
+            <a:noFill/>
+          </a:ln>
+        </p:spPr>
+        <p:style>
+          <a:lnRef idx="2">
+            <a:schemeClr val="accent1">
+              <a:shade val="50000"/>
+            </a:schemeClr>
+          </a:lnRef>
+          <a:fillRef idx="1">
+            <a:schemeClr val="accent1"/>
+          </a:fillRef>
+          <a:effectRef idx="0">
+            <a:schemeClr val="accent1"/>
+          </a:effectRef>
+          <a:fontRef idx="minor">
+            <a:schemeClr val="lt1"/>
+          </a:fontRef>
+        </p:style>
+        <p:txBody>
+          <a:bodyPr rot="0" spcFirstLastPara="0" vertOverflow="overflow" horzOverflow="overflow" vert="horz" wrap="square" lIns="91440" tIns="45720" rIns="91440" bIns="45720" numCol="1" spcCol="0" rtlCol="0" fromWordArt="0" anchor="ctr" anchorCtr="0" forceAA="0" compatLnSpc="1">
+            <a:prstTxWarp prst="textNoShape">
+              <a:avLst/>
+            </a:prstTxWarp>
+            <a:noAutofit/>
+          </a:bodyPr>
+          <a:lstStyle/>
+          <a:p>
+            <a:pPr algn="ctr"/>
+            <a:endParaRPr lang="de-DE">
+              <a:latin typeface="Roboto" panose="02000000000000000000" pitchFamily="2" charset="0"/>
+              <a:ea typeface="Roboto" panose="02000000000000000000" pitchFamily="2" charset="0"/>
+            </a:endParaRPr>
+          </a:p>
+        </p:txBody>
+      </p:sp>
+      <p:sp>
+        <p:nvSpPr>
+          <p:cNvPr id="32" name="Rectangle 31">
+            <a:extLst>
+              <a:ext uri="{FF2B5EF4-FFF2-40B4-BE49-F238E27FC236}">
+                <a16:creationId xmlns:a16="http://schemas.microsoft.com/office/drawing/2014/main" id="{7E6D1053-BE90-2F4A-BBB2-8D2FFB1E8ED0}"/>
+              </a:ext>
+            </a:extLst>
+          </p:cNvPr>
+          <p:cNvSpPr/>
+          <p:nvPr/>
+        </p:nvSpPr>
+        <p:spPr>
+          <a:xfrm rot="5400000">
+            <a:off x="2100324" y="891988"/>
+            <a:ext cx="212722" cy="212722"/>
+          </a:xfrm>
+          <a:prstGeom prst="rect">
+            <a:avLst/>
+          </a:prstGeom>
+          <a:solidFill>
+            <a:schemeClr val="tx2">
+              <a:lumMod val="60000"/>
+              <a:lumOff val="40000"/>
+            </a:schemeClr>
+          </a:solidFill>
+          <a:ln>
+            <a:noFill/>
+          </a:ln>
+        </p:spPr>
+        <p:style>
+          <a:lnRef idx="2">
+            <a:schemeClr val="accent1">
+              <a:shade val="50000"/>
+            </a:schemeClr>
+          </a:lnRef>
+          <a:fillRef idx="1">
+            <a:schemeClr val="accent1"/>
+          </a:fillRef>
+          <a:effectRef idx="0">
+            <a:schemeClr val="accent1"/>
+          </a:effectRef>
+          <a:fontRef idx="minor">
+            <a:schemeClr val="lt1"/>
+          </a:fontRef>
+        </p:style>
+        <p:txBody>
+          <a:bodyPr rot="0" spcFirstLastPara="0" vertOverflow="overflow" horzOverflow="overflow" vert="horz" wrap="square" lIns="91440" tIns="45720" rIns="91440" bIns="45720" numCol="1" spcCol="0" rtlCol="0" fromWordArt="0" anchor="ctr" anchorCtr="0" forceAA="0" compatLnSpc="1">
+            <a:prstTxWarp prst="textNoShape">
+              <a:avLst/>
+            </a:prstTxWarp>
+            <a:noAutofit/>
+          </a:bodyPr>
+          <a:lstStyle/>
+          <a:p>
+            <a:pPr algn="ctr"/>
+            <a:endParaRPr lang="de-DE">
+              <a:latin typeface="Roboto" panose="02000000000000000000" pitchFamily="2" charset="0"/>
+              <a:ea typeface="Roboto" panose="02000000000000000000" pitchFamily="2" charset="0"/>
+            </a:endParaRPr>
+          </a:p>
+        </p:txBody>
+      </p:sp>
+      <p:sp>
+        <p:nvSpPr>
+          <p:cNvPr id="33" name="Rectangle 32">
+            <a:extLst>
+              <a:ext uri="{FF2B5EF4-FFF2-40B4-BE49-F238E27FC236}">
+                <a16:creationId xmlns:a16="http://schemas.microsoft.com/office/drawing/2014/main" id="{4C501FF9-F184-3D47-B19F-ABA39828D62F}"/>
+              </a:ext>
+            </a:extLst>
+          </p:cNvPr>
+          <p:cNvSpPr/>
+          <p:nvPr/>
+        </p:nvSpPr>
+        <p:spPr>
+          <a:xfrm rot="5400000">
+            <a:off x="2093974" y="1296814"/>
+            <a:ext cx="212722" cy="212722"/>
+          </a:xfrm>
+          <a:prstGeom prst="rect">
+            <a:avLst/>
+          </a:prstGeom>
+          <a:solidFill>
+            <a:schemeClr val="tx2">
+              <a:lumMod val="60000"/>
+              <a:lumOff val="40000"/>
+            </a:schemeClr>
+          </a:solidFill>
+          <a:ln>
+            <a:noFill/>
+          </a:ln>
+        </p:spPr>
+        <p:style>
+          <a:lnRef idx="2">
+            <a:schemeClr val="accent1">
+              <a:shade val="50000"/>
+            </a:schemeClr>
+          </a:lnRef>
+          <a:fillRef idx="1">
+            <a:schemeClr val="accent1"/>
+          </a:fillRef>
+          <a:effectRef idx="0">
+            <a:schemeClr val="accent1"/>
+          </a:effectRef>
+          <a:fontRef idx="minor">
+            <a:schemeClr val="lt1"/>
+          </a:fontRef>
+        </p:style>
+        <p:txBody>
+          <a:bodyPr rot="0" spcFirstLastPara="0" vertOverflow="overflow" horzOverflow="overflow" vert="horz" wrap="square" lIns="91440" tIns="45720" rIns="91440" bIns="45720" numCol="1" spcCol="0" rtlCol="0" fromWordArt="0" anchor="ctr" anchorCtr="0" forceAA="0" compatLnSpc="1">
+            <a:prstTxWarp prst="textNoShape">
+              <a:avLst/>
+            </a:prstTxWarp>
+            <a:noAutofit/>
+          </a:bodyPr>
+          <a:lstStyle/>
+          <a:p>
+            <a:pPr algn="ctr"/>
+            <a:endParaRPr lang="de-DE">
+              <a:latin typeface="Roboto" panose="02000000000000000000" pitchFamily="2" charset="0"/>
+              <a:ea typeface="Roboto" panose="02000000000000000000" pitchFamily="2" charset="0"/>
+            </a:endParaRPr>
+          </a:p>
+        </p:txBody>
+      </p:sp>
+      <p:sp>
+        <p:nvSpPr>
+          <p:cNvPr id="34" name="Rectangle 33">
+            <a:extLst>
+              <a:ext uri="{FF2B5EF4-FFF2-40B4-BE49-F238E27FC236}">
+                <a16:creationId xmlns:a16="http://schemas.microsoft.com/office/drawing/2014/main" id="{7229FB15-5DBB-6842-BE00-1E88B941F6DC}"/>
+              </a:ext>
+            </a:extLst>
+          </p:cNvPr>
+          <p:cNvSpPr/>
+          <p:nvPr/>
+        </p:nvSpPr>
+        <p:spPr>
+          <a:xfrm rot="5400000">
+            <a:off x="1415407" y="131220"/>
+            <a:ext cx="212722" cy="212722"/>
+          </a:xfrm>
+          <a:prstGeom prst="rect">
+            <a:avLst/>
+          </a:prstGeom>
+          <a:solidFill>
+            <a:schemeClr val="tx2">
+              <a:lumMod val="60000"/>
+              <a:lumOff val="40000"/>
+            </a:schemeClr>
+          </a:solidFill>
+          <a:ln>
+            <a:noFill/>
+          </a:ln>
+        </p:spPr>
+        <p:style>
+          <a:lnRef idx="2">
+            <a:schemeClr val="accent1">
+              <a:shade val="50000"/>
+            </a:schemeClr>
+          </a:lnRef>
+          <a:fillRef idx="1">
+            <a:schemeClr val="accent1"/>
+          </a:fillRef>
+          <a:effectRef idx="0">
+            <a:schemeClr val="accent1"/>
+          </a:effectRef>
+          <a:fontRef idx="minor">
+            <a:schemeClr val="lt1"/>
+          </a:fontRef>
+        </p:style>
+        <p:txBody>
+          <a:bodyPr rot="0" spcFirstLastPara="0" vertOverflow="overflow" horzOverflow="overflow" vert="horz" wrap="square" lIns="91440" tIns="45720" rIns="91440" bIns="45720" numCol="1" spcCol="0" rtlCol="0" fromWordArt="0" anchor="ctr" anchorCtr="0" forceAA="0" compatLnSpc="1">
+            <a:prstTxWarp prst="textNoShape">
+              <a:avLst/>
+            </a:prstTxWarp>
+            <a:noAutofit/>
+          </a:bodyPr>
+          <a:lstStyle/>
+          <a:p>
+            <a:pPr algn="ctr"/>
+            <a:endParaRPr lang="de-DE">
+              <a:latin typeface="Roboto" panose="02000000000000000000" pitchFamily="2" charset="0"/>
+              <a:ea typeface="Roboto" panose="02000000000000000000" pitchFamily="2" charset="0"/>
+            </a:endParaRPr>
+          </a:p>
+        </p:txBody>
+      </p:sp>
+      <p:sp>
+        <p:nvSpPr>
+          <p:cNvPr id="36" name="Rectangle 35">
+            <a:extLst>
+              <a:ext uri="{FF2B5EF4-FFF2-40B4-BE49-F238E27FC236}">
+                <a16:creationId xmlns:a16="http://schemas.microsoft.com/office/drawing/2014/main" id="{662D4E9C-08B3-2847-846C-212DA9530710}"/>
+              </a:ext>
+            </a:extLst>
+          </p:cNvPr>
+          <p:cNvSpPr/>
+          <p:nvPr/>
+        </p:nvSpPr>
+        <p:spPr>
+          <a:xfrm rot="5400000">
+            <a:off x="1415407" y="651920"/>
+            <a:ext cx="212722" cy="212722"/>
+          </a:xfrm>
+          <a:prstGeom prst="rect">
+            <a:avLst/>
+          </a:prstGeom>
+          <a:solidFill>
+            <a:schemeClr val="tx2">
+              <a:lumMod val="60000"/>
+              <a:lumOff val="40000"/>
+            </a:schemeClr>
+          </a:solidFill>
+          <a:ln>
+            <a:noFill/>
+          </a:ln>
+        </p:spPr>
+        <p:style>
+          <a:lnRef idx="2">
+            <a:schemeClr val="accent1">
+              <a:shade val="50000"/>
+            </a:schemeClr>
+          </a:lnRef>
+          <a:fillRef idx="1">
+            <a:schemeClr val="accent1"/>
+          </a:fillRef>
+          <a:effectRef idx="0">
+            <a:schemeClr val="accent1"/>
+          </a:effectRef>
+          <a:fontRef idx="minor">
+            <a:schemeClr val="lt1"/>
+          </a:fontRef>
+        </p:style>
+        <p:txBody>
+          <a:bodyPr rot="0" spcFirstLastPara="0" vertOverflow="overflow" horzOverflow="overflow" vert="horz" wrap="square" lIns="91440" tIns="45720" rIns="91440" bIns="45720" numCol="1" spcCol="0" rtlCol="0" fromWordArt="0" anchor="ctr" anchorCtr="0" forceAA="0" compatLnSpc="1">
+            <a:prstTxWarp prst="textNoShape">
+              <a:avLst/>
+            </a:prstTxWarp>
+            <a:noAutofit/>
+          </a:bodyPr>
+          <a:lstStyle/>
+          <a:p>
+            <a:pPr algn="ctr"/>
+            <a:endParaRPr lang="de-DE">
+              <a:latin typeface="Roboto" panose="02000000000000000000" pitchFamily="2" charset="0"/>
+              <a:ea typeface="Roboto" panose="02000000000000000000" pitchFamily="2" charset="0"/>
+            </a:endParaRPr>
+          </a:p>
+        </p:txBody>
+      </p:sp>
+      <p:sp>
+        <p:nvSpPr>
+          <p:cNvPr id="37" name="Rectangle 36">
+            <a:extLst>
+              <a:ext uri="{FF2B5EF4-FFF2-40B4-BE49-F238E27FC236}">
+                <a16:creationId xmlns:a16="http://schemas.microsoft.com/office/drawing/2014/main" id="{5CC614F4-FD17-9042-A63C-1AB5B60E1F2A}"/>
+              </a:ext>
+            </a:extLst>
+          </p:cNvPr>
+          <p:cNvSpPr/>
+          <p:nvPr/>
+        </p:nvSpPr>
+        <p:spPr>
+          <a:xfrm rot="5400000">
+            <a:off x="1415407" y="992014"/>
+            <a:ext cx="212722" cy="212722"/>
+          </a:xfrm>
+          <a:prstGeom prst="rect">
+            <a:avLst/>
+          </a:prstGeom>
+          <a:solidFill>
+            <a:schemeClr val="tx2">
+              <a:lumMod val="60000"/>
+              <a:lumOff val="40000"/>
+            </a:schemeClr>
+          </a:solidFill>
+          <a:ln>
+            <a:noFill/>
+          </a:ln>
+        </p:spPr>
+        <p:style>
+          <a:lnRef idx="2">
+            <a:schemeClr val="accent1">
+              <a:shade val="50000"/>
+            </a:schemeClr>
+          </a:lnRef>
+          <a:fillRef idx="1">
+            <a:schemeClr val="accent1"/>
+          </a:fillRef>
+          <a:effectRef idx="0">
+            <a:schemeClr val="accent1"/>
+          </a:effectRef>
+          <a:fontRef idx="minor">
+            <a:schemeClr val="lt1"/>
+          </a:fontRef>
+        </p:style>
+        <p:txBody>
+          <a:bodyPr rot="0" spcFirstLastPara="0" vertOverflow="overflow" horzOverflow="overflow" vert="horz" wrap="square" lIns="91440" tIns="45720" rIns="91440" bIns="45720" numCol="1" spcCol="0" rtlCol="0" fromWordArt="0" anchor="ctr" anchorCtr="0" forceAA="0" compatLnSpc="1">
+            <a:prstTxWarp prst="textNoShape">
+              <a:avLst/>
+            </a:prstTxWarp>
+            <a:noAutofit/>
+          </a:bodyPr>
+          <a:lstStyle/>
+          <a:p>
+            <a:pPr algn="ctr"/>
+            <a:endParaRPr lang="de-DE">
+              <a:latin typeface="Roboto" panose="02000000000000000000" pitchFamily="2" charset="0"/>
+              <a:ea typeface="Roboto" panose="02000000000000000000" pitchFamily="2" charset="0"/>
+            </a:endParaRPr>
+          </a:p>
+        </p:txBody>
+      </p:sp>
+      <p:cxnSp>
+        <p:nvCxnSpPr>
+          <p:cNvPr id="38" name="Straight Connector 37">
+            <a:extLst>
+              <a:ext uri="{FF2B5EF4-FFF2-40B4-BE49-F238E27FC236}">
+                <a16:creationId xmlns:a16="http://schemas.microsoft.com/office/drawing/2014/main" id="{5ECEBAD3-1ECB-374C-B611-54124DBFE01E}"/>
+              </a:ext>
+            </a:extLst>
+          </p:cNvPr>
+          <p:cNvCxnSpPr>
+            <a:cxnSpLocks/>
+          </p:cNvCxnSpPr>
+          <p:nvPr/>
+        </p:nvCxnSpPr>
+        <p:spPr>
+          <a:xfrm rot="5400000" flipH="1">
+            <a:off x="2038906" y="1206051"/>
+            <a:ext cx="324695" cy="0"/>
+          </a:xfrm>
+          <a:prstGeom prst="line">
+            <a:avLst/>
+          </a:prstGeom>
+          <a:ln w="12700">
+            <a:solidFill>
+              <a:schemeClr val="tx2">
+                <a:lumMod val="60000"/>
+                <a:lumOff val="40000"/>
+              </a:schemeClr>
+            </a:solidFill>
+          </a:ln>
+        </p:spPr>
+        <p:style>
+          <a:lnRef idx="1">
+            <a:schemeClr val="accent1"/>
+          </a:lnRef>
+          <a:fillRef idx="0">
+            <a:schemeClr val="accent1"/>
+          </a:fillRef>
+          <a:effectRef idx="0">
+            <a:schemeClr val="accent1"/>
+          </a:effectRef>
+          <a:fontRef idx="minor">
+            <a:schemeClr val="tx1"/>
+          </a:fontRef>
+        </p:style>
+      </p:cxnSp>
+      <p:sp>
+        <p:nvSpPr>
+          <p:cNvPr id="39" name="Rectangle 38">
+            <a:extLst>
+              <a:ext uri="{FF2B5EF4-FFF2-40B4-BE49-F238E27FC236}">
+                <a16:creationId xmlns:a16="http://schemas.microsoft.com/office/drawing/2014/main" id="{953FEB3F-13F8-7A48-AA2A-E247A7B3E954}"/>
+              </a:ext>
+            </a:extLst>
+          </p:cNvPr>
+          <p:cNvSpPr/>
+          <p:nvPr/>
+        </p:nvSpPr>
+        <p:spPr>
+          <a:xfrm rot="5400000">
+            <a:off x="1415407" y="1296814"/>
+            <a:ext cx="212722" cy="212722"/>
+          </a:xfrm>
+          <a:prstGeom prst="rect">
+            <a:avLst/>
+          </a:prstGeom>
+          <a:solidFill>
+            <a:schemeClr val="tx2">
+              <a:lumMod val="60000"/>
+              <a:lumOff val="40000"/>
+            </a:schemeClr>
+          </a:solidFill>
+          <a:ln>
+            <a:noFill/>
+          </a:ln>
+        </p:spPr>
+        <p:style>
+          <a:lnRef idx="2">
+            <a:schemeClr val="accent1">
+              <a:shade val="50000"/>
+            </a:schemeClr>
+          </a:lnRef>
+          <a:fillRef idx="1">
+            <a:schemeClr val="accent1"/>
+          </a:fillRef>
+          <a:effectRef idx="0">
+            <a:schemeClr val="accent1"/>
+          </a:effectRef>
+          <a:fontRef idx="minor">
+            <a:schemeClr val="lt1"/>
+          </a:fontRef>
+        </p:style>
+        <p:txBody>
+          <a:bodyPr rot="0" spcFirstLastPara="0" vertOverflow="overflow" horzOverflow="overflow" vert="horz" wrap="square" lIns="91440" tIns="45720" rIns="91440" bIns="45720" numCol="1" spcCol="0" rtlCol="0" fromWordArt="0" anchor="ctr" anchorCtr="0" forceAA="0" compatLnSpc="1">
+            <a:prstTxWarp prst="textNoShape">
+              <a:avLst/>
+            </a:prstTxWarp>
+            <a:noAutofit/>
+          </a:bodyPr>
+          <a:lstStyle/>
+          <a:p>
+            <a:pPr algn="ctr"/>
+            <a:endParaRPr lang="de-DE">
+              <a:latin typeface="Roboto" panose="02000000000000000000" pitchFamily="2" charset="0"/>
+              <a:ea typeface="Roboto" panose="02000000000000000000" pitchFamily="2" charset="0"/>
+            </a:endParaRPr>
+          </a:p>
+        </p:txBody>
+      </p:sp>
+      <p:sp>
+        <p:nvSpPr>
+          <p:cNvPr id="40" name="Oval 39">
+            <a:extLst>
+              <a:ext uri="{FF2B5EF4-FFF2-40B4-BE49-F238E27FC236}">
+                <a16:creationId xmlns:a16="http://schemas.microsoft.com/office/drawing/2014/main" id="{182DBD6C-BABF-2849-881C-F047F69E451D}"/>
+              </a:ext>
+            </a:extLst>
+          </p:cNvPr>
+          <p:cNvSpPr/>
+          <p:nvPr/>
+        </p:nvSpPr>
+        <p:spPr>
+          <a:xfrm rot="5400000">
+            <a:off x="1803850" y="828452"/>
+            <a:ext cx="114402" cy="114402"/>
+          </a:xfrm>
+          <a:prstGeom prst="ellipse">
+            <a:avLst/>
+          </a:prstGeom>
+          <a:solidFill>
+            <a:srgbClr val="FFC000"/>
+          </a:solidFill>
+          <a:ln>
+            <a:solidFill>
+              <a:schemeClr val="tx1">
+                <a:lumMod val="50000"/>
+                <a:lumOff val="50000"/>
+              </a:schemeClr>
+            </a:solidFill>
+          </a:ln>
+        </p:spPr>
+        <p:style>
+          <a:lnRef idx="2">
+            <a:schemeClr val="accent1">
+              <a:shade val="50000"/>
+            </a:schemeClr>
+          </a:lnRef>
+          <a:fillRef idx="1">
+            <a:schemeClr val="accent1"/>
+          </a:fillRef>
+          <a:effectRef idx="0">
+            <a:schemeClr val="accent1"/>
+          </a:effectRef>
+          <a:fontRef idx="minor">
+            <a:schemeClr val="lt1"/>
+          </a:fontRef>
+        </p:style>
+        <p:txBody>
+          <a:bodyPr rot="0" spcFirstLastPara="0" vertOverflow="overflow" horzOverflow="overflow" vert="horz" wrap="square" lIns="91440" tIns="45720" rIns="91440" bIns="45720" numCol="1" spcCol="0" rtlCol="0" fromWordArt="0" anchor="ctr" anchorCtr="0" forceAA="0" compatLnSpc="1">
+            <a:prstTxWarp prst="textNoShape">
+              <a:avLst/>
+            </a:prstTxWarp>
+            <a:noAutofit/>
+          </a:bodyPr>
+          <a:lstStyle/>
+          <a:p>
+            <a:pPr algn="ctr"/>
+            <a:endParaRPr lang="de-DE">
+              <a:latin typeface="Roboto" panose="02000000000000000000" pitchFamily="2" charset="0"/>
+              <a:ea typeface="Roboto" panose="02000000000000000000" pitchFamily="2" charset="0"/>
+            </a:endParaRPr>
           </a:p>
         </p:txBody>
       </p:sp>
     </p:spTree>
     <p:extLst>
       <p:ext uri="{BB962C8B-B14F-4D97-AF65-F5344CB8AC3E}">
-        <p14:creationId xmlns:p14="http://schemas.microsoft.com/office/powerpoint/2010/main" val="312419339"/>
+        <p14:creationId xmlns:p14="http://schemas.microsoft.com/office/powerpoint/2010/main" val="1878996618"/>
+      </p:ext>
+    </p:extLst>
+  </p:cSld>
+  <p:clrMapOvr>
+    <a:masterClrMapping/>
+  </p:clrMapOvr>
+</p:sld>
+</file>
+
+<file path=ppt/slides/slide5.xml><?xml version="1.0" encoding="utf-8"?>
+<p:sld xmlns:a="http://schemas.openxmlformats.org/drawingml/2006/main" xmlns:r="http://schemas.openxmlformats.org/officeDocument/2006/relationships" xmlns:p="http://schemas.openxmlformats.org/presentationml/2006/main">
+  <p:cSld>
+    <p:spTree>
+      <p:nvGrpSpPr>
+        <p:cNvPr id="1" name=""/>
+        <p:cNvGrpSpPr/>
+        <p:nvPr/>
+      </p:nvGrpSpPr>
+      <p:grpSpPr>
+        <a:xfrm>
+          <a:off x="0" y="0"/>
+          <a:ext cx="0" cy="0"/>
+          <a:chOff x="0" y="0"/>
+          <a:chExt cx="0" cy="0"/>
+        </a:xfrm>
+      </p:grpSpPr>
+      <p:sp>
+        <p:nvSpPr>
+          <p:cNvPr id="5" name="Rectangle 4">
+            <a:extLst>
+              <a:ext uri="{FF2B5EF4-FFF2-40B4-BE49-F238E27FC236}">
+                <a16:creationId xmlns:a16="http://schemas.microsoft.com/office/drawing/2014/main" id="{BBCB2F60-3334-A74C-AB54-FF1F87C8F7AE}"/>
+              </a:ext>
+            </a:extLst>
+          </p:cNvPr>
+          <p:cNvSpPr/>
+          <p:nvPr/>
+        </p:nvSpPr>
+        <p:spPr>
+          <a:xfrm>
+            <a:off x="132334" y="191560"/>
+            <a:ext cx="3439258" cy="1809256"/>
+          </a:xfrm>
+          <a:prstGeom prst="rect">
+            <a:avLst/>
+          </a:prstGeom>
+          <a:noFill/>
+          <a:ln>
+            <a:solidFill>
+              <a:schemeClr val="tx1"/>
+            </a:solidFill>
+            <a:prstDash val="sysDot"/>
+          </a:ln>
+        </p:spPr>
+        <p:style>
+          <a:lnRef idx="2">
+            <a:schemeClr val="accent1">
+              <a:shade val="50000"/>
+            </a:schemeClr>
+          </a:lnRef>
+          <a:fillRef idx="1">
+            <a:schemeClr val="accent1"/>
+          </a:fillRef>
+          <a:effectRef idx="0">
+            <a:schemeClr val="accent1"/>
+          </a:effectRef>
+          <a:fontRef idx="minor">
+            <a:schemeClr val="lt1"/>
+          </a:fontRef>
+        </p:style>
+        <p:txBody>
+          <a:bodyPr rtlCol="0" anchor="ctr"/>
+          <a:lstStyle/>
+          <a:p>
+            <a:pPr algn="ctr"/>
+            <a:endParaRPr lang="de-DE"/>
+          </a:p>
+        </p:txBody>
+      </p:sp>
+      <p:sp>
+        <p:nvSpPr>
+          <p:cNvPr id="6" name="Rectangle 5">
+            <a:extLst>
+              <a:ext uri="{FF2B5EF4-FFF2-40B4-BE49-F238E27FC236}">
+                <a16:creationId xmlns:a16="http://schemas.microsoft.com/office/drawing/2014/main" id="{965EBF84-5C0A-0146-8B36-8F7BCE41B294}"/>
+              </a:ext>
+            </a:extLst>
+          </p:cNvPr>
+          <p:cNvSpPr/>
+          <p:nvPr/>
+        </p:nvSpPr>
+        <p:spPr>
+          <a:xfrm>
+            <a:off x="253498" y="307818"/>
+            <a:ext cx="1586250" cy="1548142"/>
+          </a:xfrm>
+          <a:prstGeom prst="rect">
+            <a:avLst/>
+          </a:prstGeom>
+          <a:noFill/>
+          <a:ln>
+            <a:solidFill>
+              <a:schemeClr val="tx1"/>
+            </a:solidFill>
+          </a:ln>
+        </p:spPr>
+        <p:style>
+          <a:lnRef idx="2">
+            <a:schemeClr val="accent1">
+              <a:shade val="50000"/>
+            </a:schemeClr>
+          </a:lnRef>
+          <a:fillRef idx="1">
+            <a:schemeClr val="accent1"/>
+          </a:fillRef>
+          <a:effectRef idx="0">
+            <a:schemeClr val="accent1"/>
+          </a:effectRef>
+          <a:fontRef idx="minor">
+            <a:schemeClr val="lt1"/>
+          </a:fontRef>
+        </p:style>
+        <p:txBody>
+          <a:bodyPr rtlCol="0" anchor="ctr"/>
+          <a:lstStyle/>
+          <a:p>
+            <a:pPr algn="ctr"/>
+            <a:endParaRPr lang="de-DE"/>
+          </a:p>
+        </p:txBody>
+      </p:sp>
+      <p:sp>
+        <p:nvSpPr>
+          <p:cNvPr id="7" name="Rectangle 6">
+            <a:extLst>
+              <a:ext uri="{FF2B5EF4-FFF2-40B4-BE49-F238E27FC236}">
+                <a16:creationId xmlns:a16="http://schemas.microsoft.com/office/drawing/2014/main" id="{7602D1C5-8209-7A48-B976-BAB60A627314}"/>
+              </a:ext>
+            </a:extLst>
+          </p:cNvPr>
+          <p:cNvSpPr/>
+          <p:nvPr/>
+        </p:nvSpPr>
+        <p:spPr>
+          <a:xfrm>
+            <a:off x="384323" y="444381"/>
+            <a:ext cx="1324598" cy="786214"/>
+          </a:xfrm>
+          <a:prstGeom prst="rect">
+            <a:avLst/>
+          </a:prstGeom>
+          <a:noFill/>
+          <a:ln>
+            <a:solidFill>
+              <a:schemeClr val="tx1"/>
+            </a:solidFill>
+          </a:ln>
+        </p:spPr>
+        <p:style>
+          <a:lnRef idx="2">
+            <a:schemeClr val="accent1">
+              <a:shade val="50000"/>
+            </a:schemeClr>
+          </a:lnRef>
+          <a:fillRef idx="1">
+            <a:schemeClr val="accent1"/>
+          </a:fillRef>
+          <a:effectRef idx="0">
+            <a:schemeClr val="accent1"/>
+          </a:effectRef>
+          <a:fontRef idx="minor">
+            <a:schemeClr val="lt1"/>
+          </a:fontRef>
+        </p:style>
+        <p:txBody>
+          <a:bodyPr rtlCol="0" anchor="ctr"/>
+          <a:lstStyle/>
+          <a:p>
+            <a:pPr algn="ctr"/>
+            <a:endParaRPr lang="de-DE"/>
+          </a:p>
+        </p:txBody>
+      </p:sp>
+      <p:sp>
+        <p:nvSpPr>
+          <p:cNvPr id="8" name="Rectangle 7">
+            <a:extLst>
+              <a:ext uri="{FF2B5EF4-FFF2-40B4-BE49-F238E27FC236}">
+                <a16:creationId xmlns:a16="http://schemas.microsoft.com/office/drawing/2014/main" id="{363338DA-A322-DE4D-86EB-2EF53D018EB6}"/>
+              </a:ext>
+            </a:extLst>
+          </p:cNvPr>
+          <p:cNvSpPr/>
+          <p:nvPr/>
+        </p:nvSpPr>
+        <p:spPr>
+          <a:xfrm>
+            <a:off x="384323" y="1339913"/>
+            <a:ext cx="607031" cy="386337"/>
+          </a:xfrm>
+          <a:prstGeom prst="rect">
+            <a:avLst/>
+          </a:prstGeom>
+          <a:noFill/>
+          <a:ln>
+            <a:solidFill>
+              <a:schemeClr val="tx1"/>
+            </a:solidFill>
+          </a:ln>
+        </p:spPr>
+        <p:style>
+          <a:lnRef idx="2">
+            <a:schemeClr val="accent1">
+              <a:shade val="50000"/>
+            </a:schemeClr>
+          </a:lnRef>
+          <a:fillRef idx="1">
+            <a:schemeClr val="accent1"/>
+          </a:fillRef>
+          <a:effectRef idx="0">
+            <a:schemeClr val="accent1"/>
+          </a:effectRef>
+          <a:fontRef idx="minor">
+            <a:schemeClr val="lt1"/>
+          </a:fontRef>
+        </p:style>
+        <p:txBody>
+          <a:bodyPr rtlCol="0" anchor="ctr"/>
+          <a:lstStyle/>
+          <a:p>
+            <a:pPr algn="ctr"/>
+            <a:endParaRPr lang="de-DE"/>
+          </a:p>
+        </p:txBody>
+      </p:sp>
+      <p:sp>
+        <p:nvSpPr>
+          <p:cNvPr id="9" name="Rectangle 8">
+            <a:extLst>
+              <a:ext uri="{FF2B5EF4-FFF2-40B4-BE49-F238E27FC236}">
+                <a16:creationId xmlns:a16="http://schemas.microsoft.com/office/drawing/2014/main" id="{A453D936-B13C-2040-90F6-E3EC9B3B7A5B}"/>
+              </a:ext>
+            </a:extLst>
+          </p:cNvPr>
+          <p:cNvSpPr/>
+          <p:nvPr/>
+        </p:nvSpPr>
+        <p:spPr>
+          <a:xfrm>
+            <a:off x="1101890" y="1339913"/>
+            <a:ext cx="607031" cy="386337"/>
+          </a:xfrm>
+          <a:prstGeom prst="rect">
+            <a:avLst/>
+          </a:prstGeom>
+          <a:noFill/>
+          <a:ln>
+            <a:solidFill>
+              <a:schemeClr val="tx1"/>
+            </a:solidFill>
+          </a:ln>
+        </p:spPr>
+        <p:style>
+          <a:lnRef idx="2">
+            <a:schemeClr val="accent1">
+              <a:shade val="50000"/>
+            </a:schemeClr>
+          </a:lnRef>
+          <a:fillRef idx="1">
+            <a:schemeClr val="accent1"/>
+          </a:fillRef>
+          <a:effectRef idx="0">
+            <a:schemeClr val="accent1"/>
+          </a:effectRef>
+          <a:fontRef idx="minor">
+            <a:schemeClr val="lt1"/>
+          </a:fontRef>
+        </p:style>
+        <p:txBody>
+          <a:bodyPr rtlCol="0" anchor="ctr"/>
+          <a:lstStyle/>
+          <a:p>
+            <a:pPr algn="ctr"/>
+            <a:endParaRPr lang="de-DE"/>
+          </a:p>
+        </p:txBody>
+      </p:sp>
+      <p:sp>
+        <p:nvSpPr>
+          <p:cNvPr id="10" name="Rounded Rectangle 9">
+            <a:extLst>
+              <a:ext uri="{FF2B5EF4-FFF2-40B4-BE49-F238E27FC236}">
+                <a16:creationId xmlns:a16="http://schemas.microsoft.com/office/drawing/2014/main" id="{B6A20D1C-768D-F047-9FE6-0B6F020B5CED}"/>
+              </a:ext>
+            </a:extLst>
+          </p:cNvPr>
+          <p:cNvSpPr/>
+          <p:nvPr/>
+        </p:nvSpPr>
+        <p:spPr>
+          <a:xfrm>
+            <a:off x="1941968" y="307818"/>
+            <a:ext cx="1530036" cy="1548142"/>
+          </a:xfrm>
+          <a:prstGeom prst="roundRect">
+            <a:avLst>
+              <a:gd name="adj" fmla="val 1875"/>
+            </a:avLst>
+          </a:prstGeom>
+          <a:noFill/>
+          <a:ln>
+            <a:solidFill>
+              <a:schemeClr val="tx1"/>
+            </a:solidFill>
+          </a:ln>
+        </p:spPr>
+        <p:style>
+          <a:lnRef idx="2">
+            <a:schemeClr val="accent1">
+              <a:shade val="50000"/>
+            </a:schemeClr>
+          </a:lnRef>
+          <a:fillRef idx="1">
+            <a:schemeClr val="accent1"/>
+          </a:fillRef>
+          <a:effectRef idx="0">
+            <a:schemeClr val="accent1"/>
+          </a:effectRef>
+          <a:fontRef idx="minor">
+            <a:schemeClr val="lt1"/>
+          </a:fontRef>
+        </p:style>
+        <p:txBody>
+          <a:bodyPr rtlCol="0" anchor="ctr"/>
+          <a:lstStyle/>
+          <a:p>
+            <a:pPr algn="ctr"/>
+            <a:endParaRPr lang="de-DE"/>
+          </a:p>
+        </p:txBody>
+      </p:sp>
+      <p:sp>
+        <p:nvSpPr>
+          <p:cNvPr id="11" name="Oval 10">
+            <a:extLst>
+              <a:ext uri="{FF2B5EF4-FFF2-40B4-BE49-F238E27FC236}">
+                <a16:creationId xmlns:a16="http://schemas.microsoft.com/office/drawing/2014/main" id="{CEAFC02D-09AB-AF41-9AF2-8731C217600E}"/>
+              </a:ext>
+            </a:extLst>
+          </p:cNvPr>
+          <p:cNvSpPr/>
+          <p:nvPr/>
+        </p:nvSpPr>
+        <p:spPr>
+          <a:xfrm>
+            <a:off x="2473940" y="402879"/>
+            <a:ext cx="466253" cy="466253"/>
+          </a:xfrm>
+          <a:prstGeom prst="ellipse">
+            <a:avLst/>
+          </a:prstGeom>
+          <a:noFill/>
+          <a:ln>
+            <a:solidFill>
+              <a:schemeClr val="tx1"/>
+            </a:solidFill>
+          </a:ln>
+        </p:spPr>
+        <p:style>
+          <a:lnRef idx="2">
+            <a:schemeClr val="accent1">
+              <a:shade val="50000"/>
+            </a:schemeClr>
+          </a:lnRef>
+          <a:fillRef idx="1">
+            <a:schemeClr val="accent1"/>
+          </a:fillRef>
+          <a:effectRef idx="0">
+            <a:schemeClr val="accent1"/>
+          </a:effectRef>
+          <a:fontRef idx="minor">
+            <a:schemeClr val="lt1"/>
+          </a:fontRef>
+        </p:style>
+        <p:txBody>
+          <a:bodyPr rtlCol="0" anchor="ctr"/>
+          <a:lstStyle/>
+          <a:p>
+            <a:pPr algn="ctr"/>
+            <a:endParaRPr lang="de-DE"/>
+          </a:p>
+        </p:txBody>
+      </p:sp>
+      <p:sp>
+        <p:nvSpPr>
+          <p:cNvPr id="12" name="Oval 11">
+            <a:extLst>
+              <a:ext uri="{FF2B5EF4-FFF2-40B4-BE49-F238E27FC236}">
+                <a16:creationId xmlns:a16="http://schemas.microsoft.com/office/drawing/2014/main" id="{E0B98B7C-FE41-5C42-AF9B-5D6003D17931}"/>
+              </a:ext>
+            </a:extLst>
+          </p:cNvPr>
+          <p:cNvSpPr/>
+          <p:nvPr/>
+        </p:nvSpPr>
+        <p:spPr>
+          <a:xfrm>
+            <a:off x="2473940" y="1308226"/>
+            <a:ext cx="466253" cy="466253"/>
+          </a:xfrm>
+          <a:prstGeom prst="ellipse">
+            <a:avLst/>
+          </a:prstGeom>
+          <a:noFill/>
+          <a:ln>
+            <a:solidFill>
+              <a:schemeClr val="tx1"/>
+            </a:solidFill>
+          </a:ln>
+        </p:spPr>
+        <p:style>
+          <a:lnRef idx="2">
+            <a:schemeClr val="accent1">
+              <a:shade val="50000"/>
+            </a:schemeClr>
+          </a:lnRef>
+          <a:fillRef idx="1">
+            <a:schemeClr val="accent1"/>
+          </a:fillRef>
+          <a:effectRef idx="0">
+            <a:schemeClr val="accent1"/>
+          </a:effectRef>
+          <a:fontRef idx="minor">
+            <a:schemeClr val="lt1"/>
+          </a:fontRef>
+        </p:style>
+        <p:txBody>
+          <a:bodyPr rtlCol="0" anchor="ctr"/>
+          <a:lstStyle/>
+          <a:p>
+            <a:pPr algn="ctr"/>
+            <a:endParaRPr lang="de-DE"/>
+          </a:p>
+        </p:txBody>
+      </p:sp>
+      <p:sp>
+        <p:nvSpPr>
+          <p:cNvPr id="13" name="Oval 12">
+            <a:extLst>
+              <a:ext uri="{FF2B5EF4-FFF2-40B4-BE49-F238E27FC236}">
+                <a16:creationId xmlns:a16="http://schemas.microsoft.com/office/drawing/2014/main" id="{89A2426D-8EB9-F244-B5E1-6D96C2EAD2B6}"/>
+              </a:ext>
+            </a:extLst>
+          </p:cNvPr>
+          <p:cNvSpPr/>
+          <p:nvPr/>
+        </p:nvSpPr>
+        <p:spPr>
+          <a:xfrm>
+            <a:off x="2005423" y="849589"/>
+            <a:ext cx="466253" cy="466253"/>
+          </a:xfrm>
+          <a:prstGeom prst="ellipse">
+            <a:avLst/>
+          </a:prstGeom>
+          <a:noFill/>
+          <a:ln>
+            <a:solidFill>
+              <a:schemeClr val="tx1"/>
+            </a:solidFill>
+          </a:ln>
+        </p:spPr>
+        <p:style>
+          <a:lnRef idx="2">
+            <a:schemeClr val="accent1">
+              <a:shade val="50000"/>
+            </a:schemeClr>
+          </a:lnRef>
+          <a:fillRef idx="1">
+            <a:schemeClr val="accent1"/>
+          </a:fillRef>
+          <a:effectRef idx="0">
+            <a:schemeClr val="accent1"/>
+          </a:effectRef>
+          <a:fontRef idx="minor">
+            <a:schemeClr val="lt1"/>
+          </a:fontRef>
+        </p:style>
+        <p:txBody>
+          <a:bodyPr rtlCol="0" anchor="ctr"/>
+          <a:lstStyle/>
+          <a:p>
+            <a:pPr algn="ctr"/>
+            <a:endParaRPr lang="de-DE"/>
+          </a:p>
+        </p:txBody>
+      </p:sp>
+      <p:sp>
+        <p:nvSpPr>
+          <p:cNvPr id="14" name="Oval 13">
+            <a:extLst>
+              <a:ext uri="{FF2B5EF4-FFF2-40B4-BE49-F238E27FC236}">
+                <a16:creationId xmlns:a16="http://schemas.microsoft.com/office/drawing/2014/main" id="{733579B3-D3E7-794F-B89F-C3FB35B4FECD}"/>
+              </a:ext>
+            </a:extLst>
+          </p:cNvPr>
+          <p:cNvSpPr/>
+          <p:nvPr/>
+        </p:nvSpPr>
+        <p:spPr>
+          <a:xfrm>
+            <a:off x="2942457" y="849589"/>
+            <a:ext cx="466253" cy="466253"/>
+          </a:xfrm>
+          <a:prstGeom prst="ellipse">
+            <a:avLst/>
+          </a:prstGeom>
+          <a:noFill/>
+          <a:ln>
+            <a:solidFill>
+              <a:schemeClr val="tx1"/>
+            </a:solidFill>
+          </a:ln>
+        </p:spPr>
+        <p:style>
+          <a:lnRef idx="2">
+            <a:schemeClr val="accent1">
+              <a:shade val="50000"/>
+            </a:schemeClr>
+          </a:lnRef>
+          <a:fillRef idx="1">
+            <a:schemeClr val="accent1"/>
+          </a:fillRef>
+          <a:effectRef idx="0">
+            <a:schemeClr val="accent1"/>
+          </a:effectRef>
+          <a:fontRef idx="minor">
+            <a:schemeClr val="lt1"/>
+          </a:fontRef>
+        </p:style>
+        <p:txBody>
+          <a:bodyPr rtlCol="0" anchor="ctr"/>
+          <a:lstStyle/>
+          <a:p>
+            <a:pPr algn="ctr"/>
+            <a:endParaRPr lang="de-DE"/>
+          </a:p>
+        </p:txBody>
+      </p:sp>
+      <p:cxnSp>
+        <p:nvCxnSpPr>
+          <p:cNvPr id="17" name="Elbow Connector 16">
+            <a:extLst>
+              <a:ext uri="{FF2B5EF4-FFF2-40B4-BE49-F238E27FC236}">
+                <a16:creationId xmlns:a16="http://schemas.microsoft.com/office/drawing/2014/main" id="{BC5DB1B5-5486-934B-88C9-BEA8CB619ECC}"/>
+              </a:ext>
+            </a:extLst>
+          </p:cNvPr>
+          <p:cNvCxnSpPr>
+            <a:stCxn id="11" idx="6"/>
+            <a:endCxn id="14" idx="0"/>
+          </p:cNvCxnSpPr>
+          <p:nvPr/>
+        </p:nvCxnSpPr>
+        <p:spPr>
+          <a:xfrm>
+            <a:off x="2940193" y="636006"/>
+            <a:ext cx="235391" cy="213583"/>
+          </a:xfrm>
+          <a:prstGeom prst="bentConnector2">
+            <a:avLst/>
+          </a:prstGeom>
+          <a:ln w="12700">
+            <a:solidFill>
+              <a:schemeClr val="tx1"/>
+            </a:solidFill>
+            <a:tailEnd type="triangle"/>
+          </a:ln>
+        </p:spPr>
+        <p:style>
+          <a:lnRef idx="1">
+            <a:schemeClr val="accent1"/>
+          </a:lnRef>
+          <a:fillRef idx="0">
+            <a:schemeClr val="accent1"/>
+          </a:fillRef>
+          <a:effectRef idx="0">
+            <a:schemeClr val="accent1"/>
+          </a:effectRef>
+          <a:fontRef idx="minor">
+            <a:schemeClr val="tx1"/>
+          </a:fontRef>
+        </p:style>
+      </p:cxnSp>
+      <p:cxnSp>
+        <p:nvCxnSpPr>
+          <p:cNvPr id="18" name="Elbow Connector 17">
+            <a:extLst>
+              <a:ext uri="{FF2B5EF4-FFF2-40B4-BE49-F238E27FC236}">
+                <a16:creationId xmlns:a16="http://schemas.microsoft.com/office/drawing/2014/main" id="{17C945DA-BBAA-3945-B0DD-F2344509C85F}"/>
+              </a:ext>
+            </a:extLst>
+          </p:cNvPr>
+          <p:cNvCxnSpPr>
+            <a:cxnSpLocks/>
+            <a:stCxn id="14" idx="4"/>
+            <a:endCxn id="12" idx="6"/>
+          </p:cNvCxnSpPr>
+          <p:nvPr/>
+        </p:nvCxnSpPr>
+        <p:spPr>
+          <a:xfrm rot="5400000">
+            <a:off x="2945134" y="1310902"/>
+            <a:ext cx="225511" cy="235391"/>
+          </a:xfrm>
+          <a:prstGeom prst="bentConnector2">
+            <a:avLst/>
+          </a:prstGeom>
+          <a:ln w="12700">
+            <a:solidFill>
+              <a:schemeClr val="tx1"/>
+            </a:solidFill>
+            <a:tailEnd type="triangle"/>
+          </a:ln>
+        </p:spPr>
+        <p:style>
+          <a:lnRef idx="1">
+            <a:schemeClr val="accent1"/>
+          </a:lnRef>
+          <a:fillRef idx="0">
+            <a:schemeClr val="accent1"/>
+          </a:fillRef>
+          <a:effectRef idx="0">
+            <a:schemeClr val="accent1"/>
+          </a:effectRef>
+          <a:fontRef idx="minor">
+            <a:schemeClr val="tx1"/>
+          </a:fontRef>
+        </p:style>
+      </p:cxnSp>
+      <p:cxnSp>
+        <p:nvCxnSpPr>
+          <p:cNvPr id="21" name="Elbow Connector 20">
+            <a:extLst>
+              <a:ext uri="{FF2B5EF4-FFF2-40B4-BE49-F238E27FC236}">
+                <a16:creationId xmlns:a16="http://schemas.microsoft.com/office/drawing/2014/main" id="{4617AE27-330B-114A-BDF8-97027BBE3757}"/>
+              </a:ext>
+            </a:extLst>
+          </p:cNvPr>
+          <p:cNvCxnSpPr>
+            <a:cxnSpLocks/>
+            <a:stCxn id="12" idx="2"/>
+            <a:endCxn id="13" idx="4"/>
+          </p:cNvCxnSpPr>
+          <p:nvPr/>
+        </p:nvCxnSpPr>
+        <p:spPr>
+          <a:xfrm rot="10800000">
+            <a:off x="2238550" y="1315843"/>
+            <a:ext cx="235390" cy="225511"/>
+          </a:xfrm>
+          <a:prstGeom prst="bentConnector2">
+            <a:avLst/>
+          </a:prstGeom>
+          <a:ln w="12700">
+            <a:solidFill>
+              <a:schemeClr val="tx1"/>
+            </a:solidFill>
+            <a:tailEnd type="triangle"/>
+          </a:ln>
+        </p:spPr>
+        <p:style>
+          <a:lnRef idx="1">
+            <a:schemeClr val="accent1"/>
+          </a:lnRef>
+          <a:fillRef idx="0">
+            <a:schemeClr val="accent1"/>
+          </a:fillRef>
+          <a:effectRef idx="0">
+            <a:schemeClr val="accent1"/>
+          </a:effectRef>
+          <a:fontRef idx="minor">
+            <a:schemeClr val="tx1"/>
+          </a:fontRef>
+        </p:style>
+      </p:cxnSp>
+      <p:cxnSp>
+        <p:nvCxnSpPr>
+          <p:cNvPr id="24" name="Elbow Connector 23">
+            <a:extLst>
+              <a:ext uri="{FF2B5EF4-FFF2-40B4-BE49-F238E27FC236}">
+                <a16:creationId xmlns:a16="http://schemas.microsoft.com/office/drawing/2014/main" id="{9016E0C3-8C3A-114A-BFCD-91C19077C7FC}"/>
+              </a:ext>
+            </a:extLst>
+          </p:cNvPr>
+          <p:cNvCxnSpPr>
+            <a:cxnSpLocks/>
+            <a:stCxn id="13" idx="0"/>
+            <a:endCxn id="11" idx="2"/>
+          </p:cNvCxnSpPr>
+          <p:nvPr/>
+        </p:nvCxnSpPr>
+        <p:spPr>
+          <a:xfrm rot="5400000" flipH="1" flipV="1">
+            <a:off x="2249454" y="625103"/>
+            <a:ext cx="213583" cy="235390"/>
+          </a:xfrm>
+          <a:prstGeom prst="bentConnector2">
+            <a:avLst/>
+          </a:prstGeom>
+          <a:ln w="12700">
+            <a:solidFill>
+              <a:schemeClr val="tx1"/>
+            </a:solidFill>
+            <a:tailEnd type="triangle"/>
+          </a:ln>
+        </p:spPr>
+        <p:style>
+          <a:lnRef idx="1">
+            <a:schemeClr val="accent1"/>
+          </a:lnRef>
+          <a:fillRef idx="0">
+            <a:schemeClr val="accent1"/>
+          </a:fillRef>
+          <a:effectRef idx="0">
+            <a:schemeClr val="accent1"/>
+          </a:effectRef>
+          <a:fontRef idx="minor">
+            <a:schemeClr val="tx1"/>
+          </a:fontRef>
+        </p:style>
+      </p:cxnSp>
+      <p:sp>
+        <p:nvSpPr>
+          <p:cNvPr id="29" name="Oval 28">
+            <a:extLst>
+              <a:ext uri="{FF2B5EF4-FFF2-40B4-BE49-F238E27FC236}">
+                <a16:creationId xmlns:a16="http://schemas.microsoft.com/office/drawing/2014/main" id="{CA30C3FD-1861-A943-AF04-C68F8FE1C8DE}"/>
+              </a:ext>
+            </a:extLst>
+          </p:cNvPr>
+          <p:cNvSpPr/>
+          <p:nvPr/>
+        </p:nvSpPr>
+        <p:spPr>
+          <a:xfrm>
+            <a:off x="467045" y="596071"/>
+            <a:ext cx="466253" cy="466253"/>
+          </a:xfrm>
+          <a:prstGeom prst="ellipse">
+            <a:avLst/>
+          </a:prstGeom>
+          <a:noFill/>
+          <a:ln>
+            <a:solidFill>
+              <a:schemeClr val="tx1"/>
+            </a:solidFill>
+          </a:ln>
+        </p:spPr>
+        <p:style>
+          <a:lnRef idx="2">
+            <a:schemeClr val="accent1">
+              <a:shade val="50000"/>
+            </a:schemeClr>
+          </a:lnRef>
+          <a:fillRef idx="1">
+            <a:schemeClr val="accent1"/>
+          </a:fillRef>
+          <a:effectRef idx="0">
+            <a:schemeClr val="accent1"/>
+          </a:effectRef>
+          <a:fontRef idx="minor">
+            <a:schemeClr val="lt1"/>
+          </a:fontRef>
+        </p:style>
+        <p:txBody>
+          <a:bodyPr rtlCol="0" anchor="ctr"/>
+          <a:lstStyle/>
+          <a:p>
+            <a:pPr algn="ctr"/>
+            <a:endParaRPr lang="de-DE"/>
+          </a:p>
+        </p:txBody>
+      </p:sp>
+      <p:sp>
+        <p:nvSpPr>
+          <p:cNvPr id="42" name="Oval 41">
+            <a:extLst>
+              <a:ext uri="{FF2B5EF4-FFF2-40B4-BE49-F238E27FC236}">
+                <a16:creationId xmlns:a16="http://schemas.microsoft.com/office/drawing/2014/main" id="{663968A6-E2E8-2D40-B5C0-E35065E98EDA}"/>
+              </a:ext>
+            </a:extLst>
+          </p:cNvPr>
+          <p:cNvSpPr/>
+          <p:nvPr/>
+        </p:nvSpPr>
+        <p:spPr>
+          <a:xfrm>
+            <a:off x="1149670" y="596071"/>
+            <a:ext cx="466253" cy="466253"/>
+          </a:xfrm>
+          <a:prstGeom prst="ellipse">
+            <a:avLst/>
+          </a:prstGeom>
+          <a:noFill/>
+          <a:ln>
+            <a:solidFill>
+              <a:schemeClr val="tx1"/>
+            </a:solidFill>
+          </a:ln>
+        </p:spPr>
+        <p:style>
+          <a:lnRef idx="2">
+            <a:schemeClr val="accent1">
+              <a:shade val="50000"/>
+            </a:schemeClr>
+          </a:lnRef>
+          <a:fillRef idx="1">
+            <a:schemeClr val="accent1"/>
+          </a:fillRef>
+          <a:effectRef idx="0">
+            <a:schemeClr val="accent1"/>
+          </a:effectRef>
+          <a:fontRef idx="minor">
+            <a:schemeClr val="lt1"/>
+          </a:fontRef>
+        </p:style>
+        <p:txBody>
+          <a:bodyPr rtlCol="0" anchor="ctr"/>
+          <a:lstStyle/>
+          <a:p>
+            <a:pPr algn="ctr"/>
+            <a:endParaRPr lang="de-DE"/>
+          </a:p>
+        </p:txBody>
+      </p:sp>
+      <p:cxnSp>
+        <p:nvCxnSpPr>
+          <p:cNvPr id="47" name="Elbow Connector 46">
+            <a:extLst>
+              <a:ext uri="{FF2B5EF4-FFF2-40B4-BE49-F238E27FC236}">
+                <a16:creationId xmlns:a16="http://schemas.microsoft.com/office/drawing/2014/main" id="{ECA056B7-930A-5149-90B0-D2C1082A44A2}"/>
+              </a:ext>
+            </a:extLst>
+          </p:cNvPr>
+          <p:cNvCxnSpPr>
+            <a:cxnSpLocks/>
+            <a:stCxn id="29" idx="6"/>
+            <a:endCxn id="42" idx="2"/>
+          </p:cNvCxnSpPr>
+          <p:nvPr/>
+        </p:nvCxnSpPr>
+        <p:spPr>
+          <a:xfrm>
+            <a:off x="933298" y="829198"/>
+            <a:ext cx="216372" cy="12700"/>
+          </a:xfrm>
+          <a:prstGeom prst="bentConnector3">
+            <a:avLst>
+              <a:gd name="adj1" fmla="val 39728"/>
+            </a:avLst>
+          </a:prstGeom>
+          <a:ln w="12700">
+            <a:solidFill>
+              <a:schemeClr val="tx1"/>
+            </a:solidFill>
+            <a:tailEnd type="triangle"/>
+          </a:ln>
+        </p:spPr>
+        <p:style>
+          <a:lnRef idx="1">
+            <a:schemeClr val="accent1"/>
+          </a:lnRef>
+          <a:fillRef idx="0">
+            <a:schemeClr val="accent1"/>
+          </a:fillRef>
+          <a:effectRef idx="0">
+            <a:schemeClr val="accent1"/>
+          </a:effectRef>
+          <a:fontRef idx="minor">
+            <a:schemeClr val="tx1"/>
+          </a:fontRef>
+        </p:style>
+      </p:cxnSp>
+    </p:spTree>
+    <p:extLst>
+      <p:ext uri="{BB962C8B-B14F-4D97-AF65-F5344CB8AC3E}">
+        <p14:creationId xmlns:p14="http://schemas.microsoft.com/office/powerpoint/2010/main" val="3121703714"/>
       </p:ext>
     </p:extLst>
   </p:cSld>

</xml_diff>